<commit_message>
check typo in P03, add excercises for VD
</commit_message>
<xml_diff>
--- a/Prezentace/PGM_03.pptx
+++ b/Prezentace/PGM_03.pptx
@@ -872,7 +872,7 @@
             <a:fld id="{B61BEF0D-F0BB-DE4B-95CE-6DB70DBA9567}" type="datetimeFigureOut">
               <a:rPr lang="en-US" dirty="0"/>
               <a:pPr/>
-              <a:t>9/13/2020</a:t>
+              <a:t>9/15/2020</a:t>
             </a:fld>
             <a:endParaRPr lang="en-US" dirty="0"/>
           </a:p>
@@ -1120,7 +1120,7 @@
             <a:fld id="{B61BEF0D-F0BB-DE4B-95CE-6DB70DBA9567}" type="datetimeFigureOut">
               <a:rPr lang="en-US" dirty="0"/>
               <a:pPr/>
-              <a:t>9/13/2020</a:t>
+              <a:t>9/15/2020</a:t>
             </a:fld>
             <a:endParaRPr lang="en-US" dirty="0"/>
           </a:p>
@@ -1431,7 +1431,7 @@
             <a:fld id="{B61BEF0D-F0BB-DE4B-95CE-6DB70DBA9567}" type="datetimeFigureOut">
               <a:rPr lang="en-US" dirty="0"/>
               <a:pPr/>
-              <a:t>9/13/2020</a:t>
+              <a:t>9/15/2020</a:t>
             </a:fld>
             <a:endParaRPr lang="en-US" dirty="0"/>
           </a:p>
@@ -1761,7 +1761,7 @@
             <a:fld id="{B61BEF0D-F0BB-DE4B-95CE-6DB70DBA9567}" type="datetimeFigureOut">
               <a:rPr lang="en-US" dirty="0"/>
               <a:pPr/>
-              <a:t>9/13/2020</a:t>
+              <a:t>9/15/2020</a:t>
             </a:fld>
             <a:endParaRPr lang="en-US" dirty="0"/>
           </a:p>
@@ -2072,7 +2072,7 @@
             <a:fld id="{B61BEF0D-F0BB-DE4B-95CE-6DB70DBA9567}" type="datetimeFigureOut">
               <a:rPr lang="en-US" dirty="0"/>
               <a:pPr/>
-              <a:t>9/13/2020</a:t>
+              <a:t>9/15/2020</a:t>
             </a:fld>
             <a:endParaRPr lang="en-US" dirty="0"/>
           </a:p>
@@ -2462,7 +2462,7 @@
             <a:fld id="{B61BEF0D-F0BB-DE4B-95CE-6DB70DBA9567}" type="datetimeFigureOut">
               <a:rPr lang="en-US" dirty="0"/>
               <a:pPr/>
-              <a:t>9/13/2020</a:t>
+              <a:t>9/15/2020</a:t>
             </a:fld>
             <a:endParaRPr lang="en-US" dirty="0"/>
           </a:p>
@@ -2628,7 +2628,7 @@
           <a:p>
             <a:fld id="{55C6B4A9-1611-4792-9094-5F34BCA07E0B}" type="datetimeFigureOut">
               <a:rPr lang="en-US" dirty="0"/>
-              <a:t>9/13/2020</a:t>
+              <a:t>9/15/2020</a:t>
             </a:fld>
             <a:endParaRPr lang="en-US" dirty="0"/>
           </a:p>
@@ -2804,7 +2804,7 @@
             <a:fld id="{B61BEF0D-F0BB-DE4B-95CE-6DB70DBA9567}" type="datetimeFigureOut">
               <a:rPr lang="en-US" dirty="0"/>
               <a:pPr/>
-              <a:t>9/13/2020</a:t>
+              <a:t>9/15/2020</a:t>
             </a:fld>
             <a:endParaRPr lang="en-US" dirty="0"/>
           </a:p>
@@ -2970,7 +2970,7 @@
           <a:p>
             <a:fld id="{42A54C80-263E-416B-A8E0-580EDEADCBDC}" type="datetimeFigureOut">
               <a:rPr lang="en-US" dirty="0"/>
-              <a:t>9/13/2020</a:t>
+              <a:t>9/15/2020</a:t>
             </a:fld>
             <a:endParaRPr lang="en-US" dirty="0"/>
           </a:p>
@@ -3213,7 +3213,7 @@
             <a:fld id="{B61BEF0D-F0BB-DE4B-95CE-6DB70DBA9567}" type="datetimeFigureOut">
               <a:rPr lang="en-US" dirty="0"/>
               <a:pPr/>
-              <a:t>9/13/2020</a:t>
+              <a:t>9/15/2020</a:t>
             </a:fld>
             <a:endParaRPr lang="en-US" dirty="0"/>
           </a:p>
@@ -3441,7 +3441,7 @@
           <a:p>
             <a:fld id="{42A54C80-263E-416B-A8E0-580EDEADCBDC}" type="datetimeFigureOut">
               <a:rPr lang="en-US" dirty="0"/>
-              <a:t>9/13/2020</a:t>
+              <a:t>9/15/2020</a:t>
             </a:fld>
             <a:endParaRPr lang="en-US" dirty="0"/>
           </a:p>
@@ -3811,7 +3811,7 @@
             <a:fld id="{B61BEF0D-F0BB-DE4B-95CE-6DB70DBA9567}" type="datetimeFigureOut">
               <a:rPr lang="en-US" dirty="0"/>
               <a:pPr/>
-              <a:t>9/13/2020</a:t>
+              <a:t>9/15/2020</a:t>
             </a:fld>
             <a:endParaRPr lang="en-US" dirty="0"/>
           </a:p>
@@ -3931,7 +3931,7 @@
             <a:fld id="{B61BEF0D-F0BB-DE4B-95CE-6DB70DBA9567}" type="datetimeFigureOut">
               <a:rPr lang="en-US" dirty="0"/>
               <a:pPr/>
-              <a:t>9/13/2020</a:t>
+              <a:t>9/15/2020</a:t>
             </a:fld>
             <a:endParaRPr lang="en-US" dirty="0"/>
           </a:p>
@@ -4023,7 +4023,7 @@
             <a:fld id="{B61BEF0D-F0BB-DE4B-95CE-6DB70DBA9567}" type="datetimeFigureOut">
               <a:rPr lang="en-US" dirty="0"/>
               <a:pPr/>
-              <a:t>9/13/2020</a:t>
+              <a:t>9/15/2020</a:t>
             </a:fld>
             <a:endParaRPr lang="en-US" dirty="0"/>
           </a:p>
@@ -4274,7 +4274,7 @@
           <a:p>
             <a:fld id="{42A54C80-263E-416B-A8E0-580EDEADCBDC}" type="datetimeFigureOut">
               <a:rPr lang="en-US" dirty="0"/>
-              <a:t>9/13/2020</a:t>
+              <a:t>9/15/2020</a:t>
             </a:fld>
             <a:endParaRPr lang="en-US" dirty="0"/>
           </a:p>
@@ -4576,7 +4576,7 @@
             <a:fld id="{B61BEF0D-F0BB-DE4B-95CE-6DB70DBA9567}" type="datetimeFigureOut">
               <a:rPr lang="en-US" dirty="0"/>
               <a:pPr/>
-              <a:t>9/13/2020</a:t>
+              <a:t>9/15/2020</a:t>
             </a:fld>
             <a:endParaRPr lang="en-US" dirty="0"/>
           </a:p>
@@ -5274,7 +5274,7 @@
             <a:fld id="{B61BEF0D-F0BB-DE4B-95CE-6DB70DBA9567}" type="datetimeFigureOut">
               <a:rPr lang="en-US" dirty="0"/>
               <a:pPr/>
-              <a:t>9/13/2020</a:t>
+              <a:t>9/15/2020</a:t>
             </a:fld>
             <a:endParaRPr lang="en-US" dirty="0"/>
           </a:p>
@@ -6243,7 +6243,7 @@
             <p:ph idx="1"/>
             <p:extLst>
               <p:ext uri="{D42A27DB-BD31-4B8C-83A1-F6EECF244321}">
-                <p14:modId xmlns:p14="http://schemas.microsoft.com/office/powerpoint/2010/main" val="1371072916"/>
+                <p14:modId xmlns:p14="http://schemas.microsoft.com/office/powerpoint/2010/main" val="2039934921"/>
               </p:ext>
             </p:extLst>
           </p:nvPr>
@@ -6457,8 +6457,13 @@
                       <a:pPr algn="ctr"/>
                       <a:r>
                         <a:rPr lang="cs-CZ" sz="2000" b="0" dirty="0"/>
-                        <a:t>--y, y++</a:t>
-                      </a:r>
+                        <a:t>--y</a:t>
+                      </a:r>
+                      <a:r>
+                        <a:rPr lang="cs-CZ" sz="2000" b="0"/>
+                        <a:t>, y--</a:t>
+                      </a:r>
+                      <a:endParaRPr lang="cs-CZ" sz="2000" b="0" dirty="0"/>
                     </a:p>
                   </a:txBody>
                   <a:tcPr marL="103371" marR="103371" marT="51685" marB="51685"/>

</xml_diff>

<commit_message>
add presentation about .NET framework
</commit_message>
<xml_diff>
--- a/Prezentace/PGM_03.pptx
+++ b/Prezentace/PGM_03.pptx
@@ -19,7 +19,6 @@
     <p:sldId id="267" r:id="rId13"/>
     <p:sldId id="268" r:id="rId14"/>
     <p:sldId id="269" r:id="rId15"/>
-    <p:sldId id="270" r:id="rId16"/>
   </p:sldIdLst>
   <p:sldSz cx="12192000" cy="6858000"/>
   <p:notesSz cx="6858000" cy="9144000"/>
@@ -872,7 +871,7 @@
             <a:fld id="{B61BEF0D-F0BB-DE4B-95CE-6DB70DBA9567}" type="datetimeFigureOut">
               <a:rPr lang="en-US" dirty="0"/>
               <a:pPr/>
-              <a:t>9/15/2020</a:t>
+              <a:t>9/20/2020</a:t>
             </a:fld>
             <a:endParaRPr lang="en-US" dirty="0"/>
           </a:p>
@@ -1120,7 +1119,7 @@
             <a:fld id="{B61BEF0D-F0BB-DE4B-95CE-6DB70DBA9567}" type="datetimeFigureOut">
               <a:rPr lang="en-US" dirty="0"/>
               <a:pPr/>
-              <a:t>9/15/2020</a:t>
+              <a:t>9/20/2020</a:t>
             </a:fld>
             <a:endParaRPr lang="en-US" dirty="0"/>
           </a:p>
@@ -1431,7 +1430,7 @@
             <a:fld id="{B61BEF0D-F0BB-DE4B-95CE-6DB70DBA9567}" type="datetimeFigureOut">
               <a:rPr lang="en-US" dirty="0"/>
               <a:pPr/>
-              <a:t>9/15/2020</a:t>
+              <a:t>9/20/2020</a:t>
             </a:fld>
             <a:endParaRPr lang="en-US" dirty="0"/>
           </a:p>
@@ -1761,7 +1760,7 @@
             <a:fld id="{B61BEF0D-F0BB-DE4B-95CE-6DB70DBA9567}" type="datetimeFigureOut">
               <a:rPr lang="en-US" dirty="0"/>
               <a:pPr/>
-              <a:t>9/15/2020</a:t>
+              <a:t>9/20/2020</a:t>
             </a:fld>
             <a:endParaRPr lang="en-US" dirty="0"/>
           </a:p>
@@ -2072,7 +2071,7 @@
             <a:fld id="{B61BEF0D-F0BB-DE4B-95CE-6DB70DBA9567}" type="datetimeFigureOut">
               <a:rPr lang="en-US" dirty="0"/>
               <a:pPr/>
-              <a:t>9/15/2020</a:t>
+              <a:t>9/20/2020</a:t>
             </a:fld>
             <a:endParaRPr lang="en-US" dirty="0"/>
           </a:p>
@@ -2462,7 +2461,7 @@
             <a:fld id="{B61BEF0D-F0BB-DE4B-95CE-6DB70DBA9567}" type="datetimeFigureOut">
               <a:rPr lang="en-US" dirty="0"/>
               <a:pPr/>
-              <a:t>9/15/2020</a:t>
+              <a:t>9/20/2020</a:t>
             </a:fld>
             <a:endParaRPr lang="en-US" dirty="0"/>
           </a:p>
@@ -2628,7 +2627,7 @@
           <a:p>
             <a:fld id="{55C6B4A9-1611-4792-9094-5F34BCA07E0B}" type="datetimeFigureOut">
               <a:rPr lang="en-US" dirty="0"/>
-              <a:t>9/15/2020</a:t>
+              <a:t>9/20/2020</a:t>
             </a:fld>
             <a:endParaRPr lang="en-US" dirty="0"/>
           </a:p>
@@ -2804,7 +2803,7 @@
             <a:fld id="{B61BEF0D-F0BB-DE4B-95CE-6DB70DBA9567}" type="datetimeFigureOut">
               <a:rPr lang="en-US" dirty="0"/>
               <a:pPr/>
-              <a:t>9/15/2020</a:t>
+              <a:t>9/20/2020</a:t>
             </a:fld>
             <a:endParaRPr lang="en-US" dirty="0"/>
           </a:p>
@@ -2970,7 +2969,7 @@
           <a:p>
             <a:fld id="{42A54C80-263E-416B-A8E0-580EDEADCBDC}" type="datetimeFigureOut">
               <a:rPr lang="en-US" dirty="0"/>
-              <a:t>9/15/2020</a:t>
+              <a:t>9/20/2020</a:t>
             </a:fld>
             <a:endParaRPr lang="en-US" dirty="0"/>
           </a:p>
@@ -3213,7 +3212,7 @@
             <a:fld id="{B61BEF0D-F0BB-DE4B-95CE-6DB70DBA9567}" type="datetimeFigureOut">
               <a:rPr lang="en-US" dirty="0"/>
               <a:pPr/>
-              <a:t>9/15/2020</a:t>
+              <a:t>9/20/2020</a:t>
             </a:fld>
             <a:endParaRPr lang="en-US" dirty="0"/>
           </a:p>
@@ -3441,7 +3440,7 @@
           <a:p>
             <a:fld id="{42A54C80-263E-416B-A8E0-580EDEADCBDC}" type="datetimeFigureOut">
               <a:rPr lang="en-US" dirty="0"/>
-              <a:t>9/15/2020</a:t>
+              <a:t>9/20/2020</a:t>
             </a:fld>
             <a:endParaRPr lang="en-US" dirty="0"/>
           </a:p>
@@ -3811,7 +3810,7 @@
             <a:fld id="{B61BEF0D-F0BB-DE4B-95CE-6DB70DBA9567}" type="datetimeFigureOut">
               <a:rPr lang="en-US" dirty="0"/>
               <a:pPr/>
-              <a:t>9/15/2020</a:t>
+              <a:t>9/20/2020</a:t>
             </a:fld>
             <a:endParaRPr lang="en-US" dirty="0"/>
           </a:p>
@@ -3931,7 +3930,7 @@
             <a:fld id="{B61BEF0D-F0BB-DE4B-95CE-6DB70DBA9567}" type="datetimeFigureOut">
               <a:rPr lang="en-US" dirty="0"/>
               <a:pPr/>
-              <a:t>9/15/2020</a:t>
+              <a:t>9/20/2020</a:t>
             </a:fld>
             <a:endParaRPr lang="en-US" dirty="0"/>
           </a:p>
@@ -4023,7 +4022,7 @@
             <a:fld id="{B61BEF0D-F0BB-DE4B-95CE-6DB70DBA9567}" type="datetimeFigureOut">
               <a:rPr lang="en-US" dirty="0"/>
               <a:pPr/>
-              <a:t>9/15/2020</a:t>
+              <a:t>9/20/2020</a:t>
             </a:fld>
             <a:endParaRPr lang="en-US" dirty="0"/>
           </a:p>
@@ -4274,7 +4273,7 @@
           <a:p>
             <a:fld id="{42A54C80-263E-416B-A8E0-580EDEADCBDC}" type="datetimeFigureOut">
               <a:rPr lang="en-US" dirty="0"/>
-              <a:t>9/15/2020</a:t>
+              <a:t>9/20/2020</a:t>
             </a:fld>
             <a:endParaRPr lang="en-US" dirty="0"/>
           </a:p>
@@ -4576,7 +4575,7 @@
             <a:fld id="{B61BEF0D-F0BB-DE4B-95CE-6DB70DBA9567}" type="datetimeFigureOut">
               <a:rPr lang="en-US" dirty="0"/>
               <a:pPr/>
-              <a:t>9/15/2020</a:t>
+              <a:t>9/20/2020</a:t>
             </a:fld>
             <a:endParaRPr lang="en-US" dirty="0"/>
           </a:p>
@@ -5274,7 +5273,7 @@
             <a:fld id="{B61BEF0D-F0BB-DE4B-95CE-6DB70DBA9567}" type="datetimeFigureOut">
               <a:rPr lang="en-US" dirty="0"/>
               <a:pPr/>
-              <a:t>9/15/2020</a:t>
+              <a:t>9/20/2020</a:t>
             </a:fld>
             <a:endParaRPr lang="en-US" dirty="0"/>
           </a:p>
@@ -9434,137 +9433,6 @@
 </p:sld>
 </file>
 
-<file path=ppt/slides/slide15.xml><?xml version="1.0" encoding="utf-8"?>
-<p:sld xmlns:a="http://schemas.openxmlformats.org/drawingml/2006/main" xmlns:r="http://schemas.openxmlformats.org/officeDocument/2006/relationships" xmlns:p="http://schemas.openxmlformats.org/presentationml/2006/main">
-  <p:cSld>
-    <p:bg>
-      <p:bgPr>
-        <a:solidFill>
-          <a:schemeClr val="bg1"/>
-        </a:solidFill>
-        <a:effectLst/>
-      </p:bgPr>
-    </p:bg>
-    <p:spTree>
-      <p:nvGrpSpPr>
-        <p:cNvPr id="1" name=""/>
-        <p:cNvGrpSpPr/>
-        <p:nvPr/>
-      </p:nvGrpSpPr>
-      <p:grpSpPr>
-        <a:xfrm>
-          <a:off x="0" y="0"/>
-          <a:ext cx="0" cy="0"/>
-          <a:chOff x="0" y="0"/>
-          <a:chExt cx="0" cy="0"/>
-        </a:xfrm>
-      </p:grpSpPr>
-      <p:sp>
-        <p:nvSpPr>
-          <p:cNvPr id="5" name="Nadpis 4">
-            <a:extLst>
-              <a:ext uri="{FF2B5EF4-FFF2-40B4-BE49-F238E27FC236}">
-                <a16:creationId xmlns:a16="http://schemas.microsoft.com/office/drawing/2014/main" id="{48F4057B-DB52-40E9-8F3D-DBD1E58DFE15}"/>
-              </a:ext>
-            </a:extLst>
-          </p:cNvPr>
-          <p:cNvSpPr>
-            <a:spLocks noGrp="1"/>
-          </p:cNvSpPr>
-          <p:nvPr>
-            <p:ph type="title"/>
-          </p:nvPr>
-        </p:nvSpPr>
-        <p:spPr/>
-        <p:txBody>
-          <a:bodyPr/>
-          <a:lstStyle/>
-          <a:p>
-            <a:pPr algn="ctr"/>
-            <a:r>
-              <a:rPr lang="cs-CZ" dirty="0" err="1"/>
-              <a:t>Kahoot</a:t>
-            </a:r>
-            <a:r>
-              <a:rPr lang="cs-CZ" dirty="0"/>
-              <a:t> </a:t>
-            </a:r>
-            <a:r>
-              <a:rPr lang="cs-CZ" dirty="0" err="1"/>
-              <a:t>time</a:t>
-            </a:r>
-            <a:r>
-              <a:rPr lang="cs-CZ" dirty="0"/>
-              <a:t>!</a:t>
-            </a:r>
-          </a:p>
-        </p:txBody>
-      </p:sp>
-      <p:pic>
-        <p:nvPicPr>
-          <p:cNvPr id="4" name="Zástupný symbol obrázku 6" descr="Obsah obrázku kreslení&#10;&#10;Popis byl vytvořen automaticky">
-            <a:extLst>
-              <a:ext uri="{FF2B5EF4-FFF2-40B4-BE49-F238E27FC236}">
-                <a16:creationId xmlns:a16="http://schemas.microsoft.com/office/drawing/2014/main" id="{205A595A-8B3B-401C-90F6-3857A019C806}"/>
-              </a:ext>
-            </a:extLst>
-          </p:cNvPr>
-          <p:cNvPicPr>
-            <a:picLocks noGrp="1" noChangeAspect="1"/>
-          </p:cNvPicPr>
-          <p:nvPr>
-            <p:ph type="pic" idx="1"/>
-          </p:nvPr>
-        </p:nvPicPr>
-        <p:blipFill rotWithShape="1">
-          <a:blip r:embed="rId2"/>
-          <a:srcRect t="27636" b="27636"/>
-          <a:stretch/>
-        </p:blipFill>
-        <p:spPr>
-          <a:prstGeom prst="rect">
-            <a:avLst/>
-          </a:prstGeom>
-        </p:spPr>
-      </p:pic>
-      <p:sp>
-        <p:nvSpPr>
-          <p:cNvPr id="6" name="Zástupný text 5">
-            <a:extLst>
-              <a:ext uri="{FF2B5EF4-FFF2-40B4-BE49-F238E27FC236}">
-                <a16:creationId xmlns:a16="http://schemas.microsoft.com/office/drawing/2014/main" id="{1D4913C2-ED97-4061-8F22-243E7DB6DD81}"/>
-              </a:ext>
-            </a:extLst>
-          </p:cNvPr>
-          <p:cNvSpPr>
-            <a:spLocks noGrp="1"/>
-          </p:cNvSpPr>
-          <p:nvPr>
-            <p:ph type="body" sz="half" idx="2"/>
-          </p:nvPr>
-        </p:nvSpPr>
-        <p:spPr/>
-        <p:txBody>
-          <a:bodyPr/>
-          <a:lstStyle/>
-          <a:p>
-            <a:endParaRPr lang="cs-CZ"/>
-          </a:p>
-        </p:txBody>
-      </p:sp>
-    </p:spTree>
-    <p:extLst>
-      <p:ext uri="{BB962C8B-B14F-4D97-AF65-F5344CB8AC3E}">
-        <p14:creationId xmlns:p14="http://schemas.microsoft.com/office/powerpoint/2010/main" val="1581245958"/>
-      </p:ext>
-    </p:extLst>
-  </p:cSld>
-  <p:clrMapOvr>
-    <a:masterClrMapping/>
-  </p:clrMapOvr>
-</p:sld>
-</file>
-
 <file path=ppt/slides/slide2.xml><?xml version="1.0" encoding="utf-8"?>
 <p:sld xmlns:a="http://schemas.openxmlformats.org/drawingml/2006/main" xmlns:r="http://schemas.openxmlformats.org/officeDocument/2006/relationships" xmlns:p="http://schemas.openxmlformats.org/presentationml/2006/main">
   <p:cSld>

</xml_diff>

<commit_message>
update programs and add comments, adding cheat sheet for programing
</commit_message>
<xml_diff>
--- a/Prezentace/PGM_03.pptx
+++ b/Prezentace/PGM_03.pptx
@@ -871,7 +871,7 @@
             <a:fld id="{B61BEF0D-F0BB-DE4B-95CE-6DB70DBA9567}" type="datetimeFigureOut">
               <a:rPr lang="en-US" dirty="0"/>
               <a:pPr/>
-              <a:t>9/20/2020</a:t>
+              <a:t>10/12/2020</a:t>
             </a:fld>
             <a:endParaRPr lang="en-US" dirty="0"/>
           </a:p>
@@ -1119,7 +1119,7 @@
             <a:fld id="{B61BEF0D-F0BB-DE4B-95CE-6DB70DBA9567}" type="datetimeFigureOut">
               <a:rPr lang="en-US" dirty="0"/>
               <a:pPr/>
-              <a:t>9/20/2020</a:t>
+              <a:t>10/12/2020</a:t>
             </a:fld>
             <a:endParaRPr lang="en-US" dirty="0"/>
           </a:p>
@@ -1430,7 +1430,7 @@
             <a:fld id="{B61BEF0D-F0BB-DE4B-95CE-6DB70DBA9567}" type="datetimeFigureOut">
               <a:rPr lang="en-US" dirty="0"/>
               <a:pPr/>
-              <a:t>9/20/2020</a:t>
+              <a:t>10/12/2020</a:t>
             </a:fld>
             <a:endParaRPr lang="en-US" dirty="0"/>
           </a:p>
@@ -1760,7 +1760,7 @@
             <a:fld id="{B61BEF0D-F0BB-DE4B-95CE-6DB70DBA9567}" type="datetimeFigureOut">
               <a:rPr lang="en-US" dirty="0"/>
               <a:pPr/>
-              <a:t>9/20/2020</a:t>
+              <a:t>10/12/2020</a:t>
             </a:fld>
             <a:endParaRPr lang="en-US" dirty="0"/>
           </a:p>
@@ -2071,7 +2071,7 @@
             <a:fld id="{B61BEF0D-F0BB-DE4B-95CE-6DB70DBA9567}" type="datetimeFigureOut">
               <a:rPr lang="en-US" dirty="0"/>
               <a:pPr/>
-              <a:t>9/20/2020</a:t>
+              <a:t>10/12/2020</a:t>
             </a:fld>
             <a:endParaRPr lang="en-US" dirty="0"/>
           </a:p>
@@ -2461,7 +2461,7 @@
             <a:fld id="{B61BEF0D-F0BB-DE4B-95CE-6DB70DBA9567}" type="datetimeFigureOut">
               <a:rPr lang="en-US" dirty="0"/>
               <a:pPr/>
-              <a:t>9/20/2020</a:t>
+              <a:t>10/12/2020</a:t>
             </a:fld>
             <a:endParaRPr lang="en-US" dirty="0"/>
           </a:p>
@@ -2627,7 +2627,7 @@
           <a:p>
             <a:fld id="{55C6B4A9-1611-4792-9094-5F34BCA07E0B}" type="datetimeFigureOut">
               <a:rPr lang="en-US" dirty="0"/>
-              <a:t>9/20/2020</a:t>
+              <a:t>10/12/2020</a:t>
             </a:fld>
             <a:endParaRPr lang="en-US" dirty="0"/>
           </a:p>
@@ -2803,7 +2803,7 @@
             <a:fld id="{B61BEF0D-F0BB-DE4B-95CE-6DB70DBA9567}" type="datetimeFigureOut">
               <a:rPr lang="en-US" dirty="0"/>
               <a:pPr/>
-              <a:t>9/20/2020</a:t>
+              <a:t>10/12/2020</a:t>
             </a:fld>
             <a:endParaRPr lang="en-US" dirty="0"/>
           </a:p>
@@ -2969,7 +2969,7 @@
           <a:p>
             <a:fld id="{42A54C80-263E-416B-A8E0-580EDEADCBDC}" type="datetimeFigureOut">
               <a:rPr lang="en-US" dirty="0"/>
-              <a:t>9/20/2020</a:t>
+              <a:t>10/12/2020</a:t>
             </a:fld>
             <a:endParaRPr lang="en-US" dirty="0"/>
           </a:p>
@@ -3212,7 +3212,7 @@
             <a:fld id="{B61BEF0D-F0BB-DE4B-95CE-6DB70DBA9567}" type="datetimeFigureOut">
               <a:rPr lang="en-US" dirty="0"/>
               <a:pPr/>
-              <a:t>9/20/2020</a:t>
+              <a:t>10/12/2020</a:t>
             </a:fld>
             <a:endParaRPr lang="en-US" dirty="0"/>
           </a:p>
@@ -3440,7 +3440,7 @@
           <a:p>
             <a:fld id="{42A54C80-263E-416B-A8E0-580EDEADCBDC}" type="datetimeFigureOut">
               <a:rPr lang="en-US" dirty="0"/>
-              <a:t>9/20/2020</a:t>
+              <a:t>10/12/2020</a:t>
             </a:fld>
             <a:endParaRPr lang="en-US" dirty="0"/>
           </a:p>
@@ -3810,7 +3810,7 @@
             <a:fld id="{B61BEF0D-F0BB-DE4B-95CE-6DB70DBA9567}" type="datetimeFigureOut">
               <a:rPr lang="en-US" dirty="0"/>
               <a:pPr/>
-              <a:t>9/20/2020</a:t>
+              <a:t>10/12/2020</a:t>
             </a:fld>
             <a:endParaRPr lang="en-US" dirty="0"/>
           </a:p>
@@ -3930,7 +3930,7 @@
             <a:fld id="{B61BEF0D-F0BB-DE4B-95CE-6DB70DBA9567}" type="datetimeFigureOut">
               <a:rPr lang="en-US" dirty="0"/>
               <a:pPr/>
-              <a:t>9/20/2020</a:t>
+              <a:t>10/12/2020</a:t>
             </a:fld>
             <a:endParaRPr lang="en-US" dirty="0"/>
           </a:p>
@@ -4022,7 +4022,7 @@
             <a:fld id="{B61BEF0D-F0BB-DE4B-95CE-6DB70DBA9567}" type="datetimeFigureOut">
               <a:rPr lang="en-US" dirty="0"/>
               <a:pPr/>
-              <a:t>9/20/2020</a:t>
+              <a:t>10/12/2020</a:t>
             </a:fld>
             <a:endParaRPr lang="en-US" dirty="0"/>
           </a:p>
@@ -4273,7 +4273,7 @@
           <a:p>
             <a:fld id="{42A54C80-263E-416B-A8E0-580EDEADCBDC}" type="datetimeFigureOut">
               <a:rPr lang="en-US" dirty="0"/>
-              <a:t>9/20/2020</a:t>
+              <a:t>10/12/2020</a:t>
             </a:fld>
             <a:endParaRPr lang="en-US" dirty="0"/>
           </a:p>
@@ -4575,7 +4575,7 @@
             <a:fld id="{B61BEF0D-F0BB-DE4B-95CE-6DB70DBA9567}" type="datetimeFigureOut">
               <a:rPr lang="en-US" dirty="0"/>
               <a:pPr/>
-              <a:t>9/20/2020</a:t>
+              <a:t>10/12/2020</a:t>
             </a:fld>
             <a:endParaRPr lang="en-US" dirty="0"/>
           </a:p>
@@ -5273,7 +5273,7 @@
             <a:fld id="{B61BEF0D-F0BB-DE4B-95CE-6DB70DBA9567}" type="datetimeFigureOut">
               <a:rPr lang="en-US" dirty="0"/>
               <a:pPr/>
-              <a:t>9/20/2020</a:t>
+              <a:t>10/12/2020</a:t>
             </a:fld>
             <a:endParaRPr lang="en-US" dirty="0"/>
           </a:p>

</xml_diff>